<commit_message>
tried not usig generators, didn't work.
</commit_message>
<xml_diff>
--- a/overview.pptx
+++ b/overview.pptx
@@ -6,7 +6,6 @@
   </p:sldMasterIdLst>
   <p:sldIdLst>
     <p:sldId id="256" r:id="rId2"/>
-    <p:sldId id="257" r:id="rId3"/>
   </p:sldIdLst>
   <p:sldSz cx="12192000" cy="6858000"/>
   <p:notesSz cx="6858000" cy="9144000"/>
@@ -4474,313 +4473,6 @@
 </p:sld>
 </file>
 
-<file path=ppt/slides/slide2.xml><?xml version="1.0" encoding="utf-8"?>
-<p:sld xmlns:a="http://schemas.openxmlformats.org/drawingml/2006/main" xmlns:r="http://schemas.openxmlformats.org/officeDocument/2006/relationships" xmlns:p="http://schemas.openxmlformats.org/presentationml/2006/main">
-  <p:cSld>
-    <p:spTree>
-      <p:nvGrpSpPr>
-        <p:cNvPr id="1" name=""/>
-        <p:cNvGrpSpPr/>
-        <p:nvPr/>
-      </p:nvGrpSpPr>
-      <p:grpSpPr>
-        <a:xfrm>
-          <a:off x="0" y="0"/>
-          <a:ext cx="0" cy="0"/>
-          <a:chOff x="0" y="0"/>
-          <a:chExt cx="0" cy="0"/>
-        </a:xfrm>
-      </p:grpSpPr>
-      <p:sp>
-        <p:nvSpPr>
-          <p:cNvPr id="32" name="Flowchart: Delay 31">
-            <a:extLst>
-              <a:ext uri="{FF2B5EF4-FFF2-40B4-BE49-F238E27FC236}">
-                <a16:creationId xmlns:a16="http://schemas.microsoft.com/office/drawing/2014/main" id="{CC8CA0DA-ED96-4A1E-B5C8-5CDF0FA8821C}"/>
-              </a:ext>
-            </a:extLst>
-          </p:cNvPr>
-          <p:cNvSpPr/>
-          <p:nvPr/>
-        </p:nvSpPr>
-        <p:spPr>
-          <a:xfrm>
-            <a:off x="870012" y="700782"/>
-            <a:ext cx="2760955" cy="1171852"/>
-          </a:xfrm>
-          <a:prstGeom prst="flowChartDelay">
-            <a:avLst/>
-          </a:prstGeom>
-        </p:spPr>
-        <p:style>
-          <a:lnRef idx="2">
-            <a:schemeClr val="accent2">
-              <a:shade val="50000"/>
-            </a:schemeClr>
-          </a:lnRef>
-          <a:fillRef idx="1">
-            <a:schemeClr val="accent2"/>
-          </a:fillRef>
-          <a:effectRef idx="0">
-            <a:schemeClr val="accent2"/>
-          </a:effectRef>
-          <a:fontRef idx="minor">
-            <a:schemeClr val="lt1"/>
-          </a:fontRef>
-        </p:style>
-        <p:txBody>
-          <a:bodyPr rtlCol="0" anchor="ctr"/>
-          <a:lstStyle/>
-          <a:p>
-            <a:pPr algn="ctr"/>
-            <a:r>
-              <a:rPr lang="en-US" dirty="0"/>
-              <a:t>img4d, </a:t>
-            </a:r>
-            <a:r>
-              <a:rPr lang="en-US" dirty="0" err="1"/>
-              <a:t>spd</a:t>
-            </a:r>
-            <a:r>
-              <a:rPr lang="en-US" dirty="0"/>
-              <a:t> = generator(</a:t>
-            </a:r>
-            <a:r>
-              <a:rPr lang="en-US" dirty="0" err="1"/>
-              <a:t>xxxx_data</a:t>
-            </a:r>
-            <a:r>
-              <a:rPr lang="en-US" dirty="0"/>
-              <a:t>)</a:t>
-            </a:r>
-          </a:p>
-        </p:txBody>
-      </p:sp>
-      <p:sp>
-        <p:nvSpPr>
-          <p:cNvPr id="38" name="TextBox 37">
-            <a:extLst>
-              <a:ext uri="{FF2B5EF4-FFF2-40B4-BE49-F238E27FC236}">
-                <a16:creationId xmlns:a16="http://schemas.microsoft.com/office/drawing/2014/main" id="{1CE16DFD-83C4-4FEC-BFD7-FE0B1F62F9C6}"/>
-              </a:ext>
-            </a:extLst>
-          </p:cNvPr>
-          <p:cNvSpPr txBox="1"/>
-          <p:nvPr/>
-        </p:nvSpPr>
-        <p:spPr>
-          <a:xfrm>
-            <a:off x="1167412" y="2413337"/>
-            <a:ext cx="9760999" cy="2862322"/>
-          </a:xfrm>
-          <a:prstGeom prst="rect">
-            <a:avLst/>
-          </a:prstGeom>
-          <a:noFill/>
-        </p:spPr>
-        <p:txBody>
-          <a:bodyPr wrap="square" rtlCol="0">
-            <a:spAutoFit/>
-          </a:bodyPr>
-          <a:lstStyle/>
-          <a:p>
-            <a:r>
-              <a:rPr lang="en-US" dirty="0"/>
-              <a:t>generator does this:</a:t>
-            </a:r>
-          </a:p>
-          <a:p>
-            <a:pPr marL="342900" indent="-342900">
-              <a:buFont typeface="+mj-lt"/>
-              <a:buAutoNum type="arabicPeriod"/>
-            </a:pPr>
-            <a:r>
-              <a:rPr lang="en-US" dirty="0"/>
-              <a:t>shuffle list of now file path. </a:t>
-            </a:r>
-            <a:r>
-              <a:rPr lang="en-US" dirty="0" err="1"/>
-              <a:t>prev</a:t>
-            </a:r>
-            <a:r>
-              <a:rPr lang="en-US" dirty="0"/>
-              <a:t> </a:t>
-            </a:r>
-            <a:r>
-              <a:rPr lang="en-US" dirty="0" err="1"/>
-              <a:t>flie</a:t>
-            </a:r>
-            <a:r>
-              <a:rPr lang="en-US" dirty="0"/>
-              <a:t> </a:t>
-            </a:r>
-            <a:r>
-              <a:rPr lang="en-US" dirty="0" err="1"/>
-              <a:t>patj</a:t>
-            </a:r>
-            <a:r>
-              <a:rPr lang="en-US" dirty="0"/>
-              <a:t>, mean(</a:t>
-            </a:r>
-            <a:r>
-              <a:rPr lang="en-US" dirty="0" err="1"/>
-              <a:t>spd</a:t>
-            </a:r>
-            <a:r>
-              <a:rPr lang="en-US" dirty="0"/>
-              <a:t> now, </a:t>
-            </a:r>
-            <a:r>
-              <a:rPr lang="en-US" dirty="0" err="1"/>
-              <a:t>spd</a:t>
-            </a:r>
-            <a:r>
-              <a:rPr lang="en-US" dirty="0"/>
-              <a:t> </a:t>
-            </a:r>
-            <a:r>
-              <a:rPr lang="en-US" dirty="0" err="1"/>
-              <a:t>prev</a:t>
-            </a:r>
-            <a:r>
-              <a:rPr lang="en-US" dirty="0"/>
-              <a:t>)</a:t>
-            </a:r>
-          </a:p>
-          <a:p>
-            <a:pPr marL="342900" indent="-342900">
-              <a:buFont typeface="+mj-lt"/>
-              <a:buAutoNum type="arabicPeriod"/>
-            </a:pPr>
-            <a:r>
-              <a:rPr lang="en-US" dirty="0"/>
-              <a:t>load now and </a:t>
-            </a:r>
-            <a:r>
-              <a:rPr lang="en-US" dirty="0" err="1"/>
-              <a:t>prev</a:t>
-            </a:r>
-            <a:r>
-              <a:rPr lang="en-US" dirty="0"/>
-              <a:t> images</a:t>
-            </a:r>
-          </a:p>
-          <a:p>
-            <a:pPr marL="342900" indent="-342900">
-              <a:buFont typeface="+mj-lt"/>
-              <a:buAutoNum type="arabicPeriod"/>
-            </a:pPr>
-            <a:r>
-              <a:rPr lang="en-US" dirty="0"/>
-              <a:t>crop now and </a:t>
-            </a:r>
-            <a:r>
-              <a:rPr lang="en-US" dirty="0" err="1"/>
-              <a:t>prev</a:t>
-            </a:r>
-            <a:r>
-              <a:rPr lang="en-US" dirty="0"/>
-              <a:t> images</a:t>
-            </a:r>
-          </a:p>
-          <a:p>
-            <a:pPr marL="342900" indent="-342900">
-              <a:buFont typeface="+mj-lt"/>
-              <a:buAutoNum type="arabicPeriod"/>
-            </a:pPr>
-            <a:r>
-              <a:rPr lang="en-US" dirty="0"/>
-              <a:t>Canny edge detection for now and </a:t>
-            </a:r>
-            <a:r>
-              <a:rPr lang="en-US" dirty="0" err="1"/>
-              <a:t>prev</a:t>
-            </a:r>
-            <a:r>
-              <a:rPr lang="en-US" dirty="0"/>
-              <a:t> images (settings should probably be learnable)</a:t>
-            </a:r>
-          </a:p>
-          <a:p>
-            <a:pPr marL="342900" indent="-342900">
-              <a:buFont typeface="+mj-lt"/>
-              <a:buAutoNum type="arabicPeriod"/>
-            </a:pPr>
-            <a:r>
-              <a:rPr lang="en-US" dirty="0"/>
-              <a:t>optical flow between edges (settings should probably be learnable)</a:t>
-            </a:r>
-          </a:p>
-          <a:p>
-            <a:endParaRPr lang="en-US" dirty="0"/>
-          </a:p>
-          <a:p>
-            <a:r>
-              <a:rPr lang="en-US" dirty="0"/>
-              <a:t>img4d= stack of optical flow output, where flow output is same size as copped image, stack is size </a:t>
-            </a:r>
-            <a:r>
-              <a:rPr lang="en-US" dirty="0" err="1"/>
-              <a:t>batch_size</a:t>
-            </a:r>
-            <a:r>
-              <a:rPr lang="en-US" dirty="0"/>
-              <a:t> fed to generator </a:t>
-            </a:r>
-          </a:p>
-          <a:p>
-            <a:endParaRPr lang="en-US" dirty="0"/>
-          </a:p>
-        </p:txBody>
-      </p:sp>
-      <p:sp>
-        <p:nvSpPr>
-          <p:cNvPr id="39" name="TextBox 38">
-            <a:extLst>
-              <a:ext uri="{FF2B5EF4-FFF2-40B4-BE49-F238E27FC236}">
-                <a16:creationId xmlns:a16="http://schemas.microsoft.com/office/drawing/2014/main" id="{C68D8F55-05C3-46AC-B084-7F5FD27A3B83}"/>
-              </a:ext>
-            </a:extLst>
-          </p:cNvPr>
-          <p:cNvSpPr txBox="1"/>
-          <p:nvPr/>
-        </p:nvSpPr>
-        <p:spPr>
-          <a:xfrm>
-            <a:off x="807868" y="1880401"/>
-            <a:ext cx="2046305" cy="369332"/>
-          </a:xfrm>
-          <a:prstGeom prst="rect">
-            <a:avLst/>
-          </a:prstGeom>
-          <a:noFill/>
-        </p:spPr>
-        <p:txBody>
-          <a:bodyPr wrap="square" rtlCol="0">
-            <a:spAutoFit/>
-          </a:bodyPr>
-          <a:lstStyle/>
-          <a:p>
-            <a:r>
-              <a:rPr lang="en-US" dirty="0"/>
-              <a:t>img4d=</a:t>
-            </a:r>
-          </a:p>
-        </p:txBody>
-      </p:sp>
-    </p:spTree>
-    <p:extLst>
-      <p:ext uri="{BB962C8B-B14F-4D97-AF65-F5344CB8AC3E}">
-        <p14:creationId xmlns:p14="http://schemas.microsoft.com/office/powerpoint/2010/main" val="4240133023"/>
-      </p:ext>
-    </p:extLst>
-  </p:cSld>
-  <p:clrMapOvr>
-    <a:masterClrMapping/>
-  </p:clrMapOvr>
-</p:sld>
-</file>
-
 <file path=ppt/theme/theme1.xml><?xml version="1.0" encoding="utf-8"?>
 <a:theme xmlns:a="http://schemas.openxmlformats.org/drawingml/2006/main" name="Office Theme">
   <a:themeElements>

</xml_diff>